<commit_message>
sync with other repo
</commit_message>
<xml_diff>
--- a/Presentations/Microservices/Microservices.pptx
+++ b/Presentations/Microservices/Microservices.pptx
@@ -168,6 +168,10 @@
 </p:presentation>
 </file>
 
+<file path=ppt/revisionInfo.xml><?xml version="1.0" encoding="utf-8"?>
+<p1510:revInfo xmlns:a="http://schemas.openxmlformats.org/drawingml/2006/main" xmlns:r="http://schemas.openxmlformats.org/officeDocument/2006/relationships" xmlns:p1510="http://schemas.microsoft.com/office/powerpoint/2015/10/main"/>
+</file>
+
 <file path=ppt/slideLayouts/slideLayout1.xml><?xml version="1.0" encoding="utf-8"?>
 <p:sldLayout xmlns:a="http://schemas.openxmlformats.org/drawingml/2006/main" xmlns:r="http://schemas.openxmlformats.org/officeDocument/2006/relationships" xmlns:p="http://schemas.openxmlformats.org/presentationml/2006/main" type="title" preserve="1">
   <p:cSld name="Diapositive de titre">
@@ -359,7 +363,7 @@
               <a:pPr>
                 <a:defRPr/>
               </a:pPr>
-              <a:t>22/02/2017</a:t>
+              <a:t>06/06/2017</a:t>
             </a:fld>
             <a:endParaRPr lang="fr-CA"/>
           </a:p>
@@ -551,7 +555,7 @@
               <a:pPr>
                 <a:defRPr/>
               </a:pPr>
-              <a:t>22/02/2017</a:t>
+              <a:t>06/06/2017</a:t>
             </a:fld>
             <a:endParaRPr lang="fr-CA"/>
           </a:p>
@@ -753,7 +757,7 @@
               <a:pPr>
                 <a:defRPr/>
               </a:pPr>
-              <a:t>22/02/2017</a:t>
+              <a:t>06/06/2017</a:t>
             </a:fld>
             <a:endParaRPr lang="fr-CA"/>
           </a:p>
@@ -945,7 +949,7 @@
               <a:pPr>
                 <a:defRPr/>
               </a:pPr>
-              <a:t>22/02/2017</a:t>
+              <a:t>06/06/2017</a:t>
             </a:fld>
             <a:endParaRPr lang="fr-CA"/>
           </a:p>
@@ -1213,7 +1217,7 @@
               <a:pPr>
                 <a:defRPr/>
               </a:pPr>
-              <a:t>22/02/2017</a:t>
+              <a:t>06/06/2017</a:t>
             </a:fld>
             <a:endParaRPr lang="fr-CA"/>
           </a:p>
@@ -1523,7 +1527,7 @@
               <a:pPr>
                 <a:defRPr/>
               </a:pPr>
-              <a:t>22/02/2017</a:t>
+              <a:t>06/06/2017</a:t>
             </a:fld>
             <a:endParaRPr lang="fr-CA"/>
           </a:p>
@@ -1967,7 +1971,7 @@
               <a:pPr>
                 <a:defRPr/>
               </a:pPr>
-              <a:t>22/02/2017</a:t>
+              <a:t>06/06/2017</a:t>
             </a:fld>
             <a:endParaRPr lang="fr-CA"/>
           </a:p>
@@ -2107,7 +2111,7 @@
               <a:pPr>
                 <a:defRPr/>
               </a:pPr>
-              <a:t>22/02/2017</a:t>
+              <a:t>06/06/2017</a:t>
             </a:fld>
             <a:endParaRPr lang="fr-CA"/>
           </a:p>
@@ -2224,7 +2228,7 @@
               <a:pPr>
                 <a:defRPr/>
               </a:pPr>
-              <a:t>22/02/2017</a:t>
+              <a:t>06/06/2017</a:t>
             </a:fld>
             <a:endParaRPr lang="fr-CA"/>
           </a:p>
@@ -2523,7 +2527,7 @@
               <a:pPr>
                 <a:defRPr/>
               </a:pPr>
-              <a:t>22/02/2017</a:t>
+              <a:t>06/06/2017</a:t>
             </a:fld>
             <a:endParaRPr lang="fr-CA"/>
           </a:p>
@@ -2805,7 +2809,7 @@
               <a:pPr>
                 <a:defRPr/>
               </a:pPr>
-              <a:t>22/02/2017</a:t>
+              <a:t>06/06/2017</a:t>
             </a:fld>
             <a:endParaRPr lang="fr-CA"/>
           </a:p>
@@ -3069,7 +3073,7 @@
               <a:pPr>
                 <a:defRPr/>
               </a:pPr>
-              <a:t>22/02/2017</a:t>
+              <a:t>06/06/2017</a:t>
             </a:fld>
             <a:endParaRPr lang="fr-CA"/>
           </a:p>
@@ -5008,7 +5012,7 @@
                   <a:srgbClr val="3C5790"/>
                 </a:solidFill>
               </a:rPr>
-              <a:t> </a:t>
+              <a:t> are </a:t>
             </a:r>
             <a:r>
               <a:rPr lang="fr-CA" sz="1600" dirty="0" err="1">
@@ -5016,7 +5020,7 @@
                   <a:srgbClr val="3C5790"/>
                 </a:solidFill>
               </a:rPr>
-              <a:t>is</a:t>
+              <a:t>Microservices</a:t>
             </a:r>
             <a:r>
               <a:rPr lang="fr-CA" sz="1600" dirty="0">
@@ -5024,7 +5028,7 @@
                   <a:srgbClr val="3C5790"/>
                 </a:solidFill>
               </a:rPr>
-              <a:t> Servlet?</a:t>
+              <a:t> ?</a:t>
             </a:r>
           </a:p>
           <a:p>
@@ -5275,13 +5279,18 @@
               <a:t>Microservices</a:t>
             </a:r>
             <a:r>
-              <a:rPr lang="fr-CA" dirty="0">
+              <a:rPr lang="fr-CA">
                 <a:solidFill>
                   <a:schemeClr val="bg1"/>
                 </a:solidFill>
               </a:rPr>
-              <a:t>?</a:t>
-            </a:r>
+              <a:t> ?</a:t>
+            </a:r>
+            <a:endParaRPr lang="fr-CA" dirty="0">
+              <a:solidFill>
+                <a:schemeClr val="bg1"/>
+              </a:solidFill>
+            </a:endParaRPr>
           </a:p>
         </p:txBody>
       </p:sp>

</xml_diff>